<commit_message>
add ppt chapter 03
</commit_message>
<xml_diff>
--- a/02_PreProcessing/02_PreProcessing.pptx
+++ b/02_PreProcessing/02_PreProcessing.pptx
@@ -238,7 +238,7 @@
           <a:p>
             <a:fld id="{05BF5AB9-3463-4E65-AFD3-5431B79ADFDC}" type="datetimeFigureOut">
               <a:rPr lang="zh-TW" altLang="en-US" smtClean="0"/>
-              <a:t>2020/5/2</a:t>
+              <a:t>2020/5/3</a:t>
             </a:fld>
             <a:endParaRPr lang="zh-TW" altLang="en-US"/>
           </a:p>
@@ -403,7 +403,7 @@
           <a:p>
             <a:fld id="{838FF680-7B6B-4655-B6A1-33A8AD0AE8B4}" type="datetimeFigureOut">
               <a:rPr lang="zh-TW" altLang="en-US" smtClean="0"/>
-              <a:t>2020/5/2</a:t>
+              <a:t>2020/5/3</a:t>
             </a:fld>
             <a:endParaRPr lang="zh-TW" altLang="en-US"/>
           </a:p>
@@ -7808,6 +7808,66 @@
       </p:grpSpPr>
       <p:sp>
         <p:nvSpPr>
+          <p:cNvPr id="8" name="內容版面配置區 1">
+            <a:extLst>
+              <a:ext uri="{FF2B5EF4-FFF2-40B4-BE49-F238E27FC236}">
+                <a16:creationId xmlns:a16="http://schemas.microsoft.com/office/drawing/2014/main" id="{65A4E201-3D61-454B-BE26-2CD604BE45BB}"/>
+              </a:ext>
+            </a:extLst>
+          </p:cNvPr>
+          <p:cNvSpPr>
+            <a:spLocks noGrp="1"/>
+          </p:cNvSpPr>
+          <p:nvPr>
+            <p:ph idx="1"/>
+          </p:nvPr>
+        </p:nvSpPr>
+        <p:spPr>
+          <a:xfrm>
+            <a:off x="272480" y="764704"/>
+            <a:ext cx="9328720" cy="5879678"/>
+          </a:xfrm>
+        </p:spPr>
+        <p:txBody>
+          <a:bodyPr>
+            <a:normAutofit/>
+          </a:bodyPr>
+          <a:lstStyle/>
+          <a:p>
+            <a:r>
+              <a:rPr lang="en-US" altLang="zh-TW" dirty="0" err="1"/>
+              <a:t>OneHot</a:t>
+            </a:r>
+            <a:r>
+              <a:rPr lang="en-US" altLang="zh-TW" dirty="0"/>
+              <a:t> Encoding</a:t>
+            </a:r>
+          </a:p>
+          <a:p>
+            <a:endParaRPr lang="en-US" dirty="0"/>
+          </a:p>
+          <a:p>
+            <a:endParaRPr lang="en-US" dirty="0"/>
+          </a:p>
+          <a:p>
+            <a:endParaRPr lang="en-US" dirty="0"/>
+          </a:p>
+          <a:p>
+            <a:endParaRPr lang="en-US" dirty="0"/>
+          </a:p>
+          <a:p>
+            <a:endParaRPr lang="en-US" dirty="0"/>
+          </a:p>
+          <a:p>
+            <a:r>
+              <a:rPr lang="en-US" dirty="0"/>
+              <a:t>NLP Example</a:t>
+            </a:r>
+          </a:p>
+        </p:txBody>
+      </p:sp>
+      <p:sp>
+        <p:nvSpPr>
           <p:cNvPr id="3" name="投影片編號版面配置區 2">
             <a:extLst>
               <a:ext uri="{FF2B5EF4-FFF2-40B4-BE49-F238E27FC236}">
@@ -7886,7 +7946,7 @@
         </p:blipFill>
         <p:spPr>
           <a:xfrm>
-            <a:off x="0" y="914400"/>
+            <a:off x="0" y="1262460"/>
             <a:ext cx="9906000" cy="3004740"/>
           </a:xfrm>
           <a:prstGeom prst="rect">
@@ -7916,7 +7976,7 @@
         </p:blipFill>
         <p:spPr>
           <a:xfrm>
-            <a:off x="0" y="4419600"/>
+            <a:off x="0" y="4793412"/>
             <a:ext cx="9906000" cy="1226388"/>
           </a:xfrm>
           <a:prstGeom prst="rect">

</xml_diff>